<commit_message>
Added some old (but still valid) material from local disk and added json to the slides and as an optional lab in module 2. Also minor addition about a local service being available for Lab 8 description.
</commit_message>
<xml_diff>
--- a/Slides/Module 2 - Schemas.pptx
+++ b/Slides/Module 2 - Schemas.pptx
@@ -6,10 +6,10 @@
     <p:sldMasterId id="2147484034" r:id="rId3"/>
   </p:sldMasterIdLst>
   <p:notesMasterIdLst>
-    <p:notesMasterId r:id="rId29"/>
+    <p:notesMasterId r:id="rId30"/>
   </p:notesMasterIdLst>
   <p:handoutMasterIdLst>
-    <p:handoutMasterId r:id="rId30"/>
+    <p:handoutMasterId r:id="rId31"/>
   </p:handoutMasterIdLst>
   <p:sldIdLst>
     <p:sldId id="309" r:id="rId4"/>
@@ -21,22 +21,23 @@
     <p:sldId id="316" r:id="rId10"/>
     <p:sldId id="291" r:id="rId11"/>
     <p:sldId id="292" r:id="rId12"/>
-    <p:sldId id="293" r:id="rId13"/>
-    <p:sldId id="294" r:id="rId14"/>
-    <p:sldId id="317" r:id="rId15"/>
-    <p:sldId id="300" r:id="rId16"/>
-    <p:sldId id="310" r:id="rId17"/>
-    <p:sldId id="298" r:id="rId18"/>
-    <p:sldId id="296" r:id="rId19"/>
-    <p:sldId id="301" r:id="rId20"/>
-    <p:sldId id="302" r:id="rId21"/>
-    <p:sldId id="303" r:id="rId22"/>
-    <p:sldId id="304" r:id="rId23"/>
-    <p:sldId id="305" r:id="rId24"/>
-    <p:sldId id="311" r:id="rId25"/>
-    <p:sldId id="312" r:id="rId26"/>
-    <p:sldId id="313" r:id="rId27"/>
-    <p:sldId id="314" r:id="rId28"/>
+    <p:sldId id="318" r:id="rId13"/>
+    <p:sldId id="293" r:id="rId14"/>
+    <p:sldId id="294" r:id="rId15"/>
+    <p:sldId id="317" r:id="rId16"/>
+    <p:sldId id="300" r:id="rId17"/>
+    <p:sldId id="310" r:id="rId18"/>
+    <p:sldId id="298" r:id="rId19"/>
+    <p:sldId id="296" r:id="rId20"/>
+    <p:sldId id="301" r:id="rId21"/>
+    <p:sldId id="302" r:id="rId22"/>
+    <p:sldId id="303" r:id="rId23"/>
+    <p:sldId id="304" r:id="rId24"/>
+    <p:sldId id="305" r:id="rId25"/>
+    <p:sldId id="311" r:id="rId26"/>
+    <p:sldId id="312" r:id="rId27"/>
+    <p:sldId id="313" r:id="rId28"/>
+    <p:sldId id="314" r:id="rId29"/>
   </p:sldIdLst>
   <p:sldSz cx="9144000" cy="6858000" type="screen4x3"/>
   <p:notesSz cx="6858000" cy="9144000"/>
@@ -187,6 +188,10 @@
 </p:presentation>
 </file>
 
+<file path=ppt/revisionInfo.xml><?xml version="1.0" encoding="utf-8"?>
+<p1510:revInfo xmlns:a="http://schemas.openxmlformats.org/drawingml/2006/main" xmlns:r="http://schemas.openxmlformats.org/officeDocument/2006/relationships" xmlns:p1510="http://schemas.microsoft.com/office/powerpoint/2015/10/main"/>
+</file>
+
 <file path=ppt/handoutMasters/handoutMaster1.xml><?xml version="1.0" encoding="utf-8"?>
 <p:handoutMaster xmlns:a="http://schemas.openxmlformats.org/drawingml/2006/main" xmlns:r="http://schemas.openxmlformats.org/officeDocument/2006/relationships" xmlns:p="http://schemas.openxmlformats.org/presentationml/2006/main">
   <p:cSld>
@@ -313,7 +318,7 @@
               <a:pPr>
                 <a:defRPr/>
               </a:pPr>
-              <a:t>16 December 2016</a:t>
+              <a:t>28 January 2018</a:t>
             </a:fld>
             <a:endParaRPr lang="de-DE"/>
           </a:p>
@@ -625,7 +630,7 @@
               <a:pPr>
                 <a:defRPr/>
               </a:pPr>
-              <a:t>16. Dezember 2016</a:t>
+              <a:t>28. Januar 2018</a:t>
             </a:fld>
             <a:r>
               <a:rPr lang="de-DE"/>
@@ -943,7 +948,7 @@
               <a:pPr>
                 <a:defRPr/>
               </a:pPr>
-              <a:t>16. Dezember 2016</a:t>
+              <a:t>28. Januar 2018</a:t>
             </a:fld>
             <a:r>
               <a:rPr lang="de-DE"/>
@@ -1067,7 +1072,7 @@
               <a:pPr>
                 <a:defRPr/>
               </a:pPr>
-              <a:t>16. Dezember 2016</a:t>
+              <a:t>28. Januar 2018</a:t>
             </a:fld>
             <a:r>
               <a:rPr lang="de-DE"/>
@@ -1099,7 +1104,7 @@
               <a:pPr>
                 <a:defRPr/>
               </a:pPr>
-              <a:t>23</a:t>
+              <a:t>24</a:t>
             </a:fld>
             <a:endParaRPr lang="de-DE"/>
           </a:p>
@@ -1189,7 +1194,7 @@
               <a:pPr>
                 <a:defRPr/>
               </a:pPr>
-              <a:t>16. Dezember 2016</a:t>
+              <a:t>28. Januar 2018</a:t>
             </a:fld>
             <a:r>
               <a:rPr lang="de-DE"/>
@@ -1221,7 +1226,7 @@
               <a:pPr>
                 <a:defRPr/>
               </a:pPr>
-              <a:t>25</a:t>
+              <a:t>26</a:t>
             </a:fld>
             <a:endParaRPr lang="de-DE"/>
           </a:p>
@@ -1719,7 +1724,7 @@
               <a:pPr>
                 <a:defRPr/>
               </a:pPr>
-              <a:t>16. Dezember 2016</a:t>
+              <a:t>28. Januar 2018</a:t>
             </a:fld>
             <a:r>
               <a:rPr lang="de-DE"/>
@@ -1841,7 +1846,7 @@
               <a:pPr>
                 <a:defRPr/>
               </a:pPr>
-              <a:t>16. Dezember 2016</a:t>
+              <a:t>28. Januar 2018</a:t>
             </a:fld>
             <a:r>
               <a:rPr lang="de-DE"/>
@@ -2022,7 +2027,7 @@
               <a:pPr>
                 <a:defRPr/>
               </a:pPr>
-              <a:t>16. Dezember 2016</a:t>
+              <a:t>28. Januar 2018</a:t>
             </a:fld>
             <a:r>
               <a:rPr lang="de-DE"/>
@@ -2204,7 +2209,7 @@
               <a:pPr>
                 <a:defRPr/>
               </a:pPr>
-              <a:t>16. Dezember 2016</a:t>
+              <a:t>28. Januar 2018</a:t>
             </a:fld>
             <a:r>
               <a:rPr lang="de-DE"/>
@@ -2350,7 +2355,7 @@
               <a:pPr>
                 <a:defRPr/>
               </a:pPr>
-              <a:t>16. Dezember 2016</a:t>
+              <a:t>28. Januar 2018</a:t>
             </a:fld>
             <a:r>
               <a:rPr lang="de-DE"/>
@@ -2382,7 +2387,7 @@
               <a:pPr>
                 <a:defRPr/>
               </a:pPr>
-              <a:t>11</a:t>
+              <a:t>12</a:t>
             </a:fld>
             <a:endParaRPr lang="de-DE"/>
           </a:p>
@@ -2480,7 +2485,7 @@
               <a:pPr>
                 <a:defRPr/>
               </a:pPr>
-              <a:t>16. Dezember 2016</a:t>
+              <a:t>28. Januar 2018</a:t>
             </a:fld>
             <a:r>
               <a:rPr lang="de-DE"/>
@@ -2512,7 +2517,7 @@
               <a:pPr>
                 <a:defRPr/>
               </a:pPr>
-              <a:t>12</a:t>
+              <a:t>13</a:t>
             </a:fld>
             <a:endParaRPr lang="de-DE"/>
           </a:p>
@@ -2755,7 +2760,7 @@
               <a:pPr>
                 <a:defRPr/>
               </a:pPr>
-              <a:t>16. Dezember 2016</a:t>
+              <a:t>28. Januar 2018</a:t>
             </a:fld>
             <a:r>
               <a:rPr lang="de-DE"/>
@@ -2787,7 +2792,7 @@
               <a:pPr>
                 <a:defRPr/>
               </a:pPr>
-              <a:t>19</a:t>
+              <a:t>20</a:t>
             </a:fld>
             <a:endParaRPr lang="de-DE"/>
           </a:p>
@@ -3033,7 +3038,7 @@
               <a:pPr>
                 <a:defRPr/>
               </a:pPr>
-              <a:t>16. Dezember 2016</a:t>
+              <a:t>28. Januar 2018</a:t>
             </a:fld>
             <a:r>
               <a:rPr lang="de-DE"/>
@@ -3065,7 +3070,7 @@
               <a:pPr>
                 <a:defRPr/>
               </a:pPr>
-              <a:t>21</a:t>
+              <a:t>22</a:t>
             </a:fld>
             <a:endParaRPr lang="de-DE"/>
           </a:p>
@@ -3213,7 +3218,7 @@
           <a:p>
             <a:fld id="{076141BC-180D-4B6E-943F-01699F625B70}" type="datetimeFigureOut">
               <a:rPr lang="en-US" smtClean="0"/>
-              <a:t>12/16/2016</a:t>
+              <a:t>1/28/2018</a:t>
             </a:fld>
             <a:endParaRPr lang="en-US"/>
           </a:p>
@@ -3381,7 +3386,7 @@
           <a:p>
             <a:fld id="{076141BC-180D-4B6E-943F-01699F625B70}" type="datetimeFigureOut">
               <a:rPr lang="en-US" smtClean="0"/>
-              <a:t>12/16/2016</a:t>
+              <a:t>1/28/2018</a:t>
             </a:fld>
             <a:endParaRPr lang="en-US"/>
           </a:p>
@@ -3559,7 +3564,7 @@
           <a:p>
             <a:fld id="{076141BC-180D-4B6E-943F-01699F625B70}" type="datetimeFigureOut">
               <a:rPr lang="en-US" smtClean="0"/>
-              <a:t>12/16/2016</a:t>
+              <a:t>1/28/2018</a:t>
             </a:fld>
             <a:endParaRPr lang="en-US"/>
           </a:p>
@@ -5003,7 +5008,7 @@
           <a:p>
             <a:fld id="{076141BC-180D-4B6E-943F-01699F625B70}" type="datetimeFigureOut">
               <a:rPr lang="en-US" smtClean="0"/>
-              <a:t>12/16/2016</a:t>
+              <a:t>1/28/2018</a:t>
             </a:fld>
             <a:endParaRPr lang="en-US"/>
           </a:p>
@@ -6304,7 +6309,7 @@
           <a:p>
             <a:fld id="{076141BC-180D-4B6E-943F-01699F625B70}" type="datetimeFigureOut">
               <a:rPr lang="en-US" smtClean="0"/>
-              <a:t>12/16/2016</a:t>
+              <a:t>1/28/2018</a:t>
             </a:fld>
             <a:endParaRPr lang="en-US"/>
           </a:p>
@@ -6533,7 +6538,7 @@
           <a:p>
             <a:fld id="{076141BC-180D-4B6E-943F-01699F625B70}" type="datetimeFigureOut">
               <a:rPr lang="en-US" smtClean="0"/>
-              <a:t>12/16/2016</a:t>
+              <a:t>1/28/2018</a:t>
             </a:fld>
             <a:endParaRPr lang="en-US"/>
           </a:p>
@@ -6897,7 +6902,7 @@
           <a:p>
             <a:fld id="{076141BC-180D-4B6E-943F-01699F625B70}" type="datetimeFigureOut">
               <a:rPr lang="en-US" smtClean="0"/>
-              <a:t>12/16/2016</a:t>
+              <a:t>1/28/2018</a:t>
             </a:fld>
             <a:endParaRPr lang="en-US"/>
           </a:p>
@@ -7014,7 +7019,7 @@
           <a:p>
             <a:fld id="{076141BC-180D-4B6E-943F-01699F625B70}" type="datetimeFigureOut">
               <a:rPr lang="en-US" smtClean="0"/>
-              <a:t>12/16/2016</a:t>
+              <a:t>1/28/2018</a:t>
             </a:fld>
             <a:endParaRPr lang="en-US"/>
           </a:p>
@@ -7109,7 +7114,7 @@
           <a:p>
             <a:fld id="{076141BC-180D-4B6E-943F-01699F625B70}" type="datetimeFigureOut">
               <a:rPr lang="en-US" smtClean="0"/>
-              <a:t>12/16/2016</a:t>
+              <a:t>1/28/2018</a:t>
             </a:fld>
             <a:endParaRPr lang="en-US"/>
           </a:p>
@@ -7384,7 +7389,7 @@
           <a:p>
             <a:fld id="{076141BC-180D-4B6E-943F-01699F625B70}" type="datetimeFigureOut">
               <a:rPr lang="en-US" smtClean="0"/>
-              <a:t>12/16/2016</a:t>
+              <a:t>1/28/2018</a:t>
             </a:fld>
             <a:endParaRPr lang="en-US"/>
           </a:p>
@@ -7636,7 +7641,7 @@
           <a:p>
             <a:fld id="{076141BC-180D-4B6E-943F-01699F625B70}" type="datetimeFigureOut">
               <a:rPr lang="en-US" smtClean="0"/>
-              <a:t>12/16/2016</a:t>
+              <a:t>1/28/2018</a:t>
             </a:fld>
             <a:endParaRPr lang="en-US"/>
           </a:p>
@@ -7847,7 +7852,7 @@
           <a:p>
             <a:fld id="{076141BC-180D-4B6E-943F-01699F625B70}" type="datetimeFigureOut">
               <a:rPr lang="en-US" smtClean="0"/>
-              <a:t>12/16/2016</a:t>
+              <a:t>1/28/2018</a:t>
             </a:fld>
             <a:endParaRPr lang="en-US"/>
           </a:p>
@@ -8939,6 +8944,653 @@
       </p:grpSpPr>
       <p:sp>
         <p:nvSpPr>
+          <p:cNvPr id="17410" name="Title 1"/>
+          <p:cNvSpPr>
+            <a:spLocks noGrp="1"/>
+          </p:cNvSpPr>
+          <p:nvPr>
+            <p:ph type="title"/>
+          </p:nvPr>
+        </p:nvSpPr>
+        <p:spPr/>
+        <p:txBody>
+          <a:bodyPr/>
+          <a:lstStyle/>
+          <a:p>
+            <a:r>
+              <a:rPr lang="sv-SE" dirty="0"/>
+              <a:t>Other common file formats supported by BizTalk</a:t>
+            </a:r>
+          </a:p>
+        </p:txBody>
+      </p:sp>
+      <p:graphicFrame>
+        <p:nvGraphicFramePr>
+          <p:cNvPr id="6" name="Table 5"/>
+          <p:cNvGraphicFramePr>
+            <a:graphicFrameLocks noGrp="1"/>
+          </p:cNvGraphicFramePr>
+          <p:nvPr>
+            <p:extLst>
+              <p:ext uri="{D42A27DB-BD31-4B8C-83A1-F6EECF244321}">
+                <p14:modId xmlns:p14="http://schemas.microsoft.com/office/powerpoint/2010/main" val="3775809859"/>
+              </p:ext>
+            </p:extLst>
+          </p:nvPr>
+        </p:nvGraphicFramePr>
+        <p:xfrm>
+          <a:off x="285750" y="1285875"/>
+          <a:ext cx="8643938" cy="5407431"/>
+        </p:xfrm>
+        <a:graphic>
+          <a:graphicData uri="http://schemas.openxmlformats.org/drawingml/2006/table">
+            <a:tbl>
+              <a:tblPr firstRow="1" bandRow="1">
+                <a:tableStyleId>{5C22544A-7EE6-4342-B048-85BDC9FD1C3A}</a:tableStyleId>
+              </a:tblPr>
+              <a:tblGrid>
+                <a:gridCol w="4143375">
+                  <a:extLst>
+                    <a:ext uri="{9D8B030D-6E8A-4147-A177-3AD203B41FA5}">
+                      <a16:colId xmlns:a16="http://schemas.microsoft.com/office/drawing/2014/main" val="20000"/>
+                    </a:ext>
+                  </a:extLst>
+                </a:gridCol>
+                <a:gridCol w="4500563">
+                  <a:extLst>
+                    <a:ext uri="{9D8B030D-6E8A-4147-A177-3AD203B41FA5}">
+                      <a16:colId xmlns:a16="http://schemas.microsoft.com/office/drawing/2014/main" val="20001"/>
+                    </a:ext>
+                  </a:extLst>
+                </a:gridCol>
+              </a:tblGrid>
+              <a:tr h="500127">
+                <a:tc>
+                  <a:txBody>
+                    <a:bodyPr/>
+                    <a:lstStyle/>
+                    <a:p>
+                      <a:r>
+                        <a:rPr lang="sv-SE" sz="1800" dirty="0"/>
+                        <a:t>File Type</a:t>
+                      </a:r>
+                    </a:p>
+                  </a:txBody>
+                  <a:tcPr marL="91439" marR="91439" marT="45726" marB="45726"/>
+                </a:tc>
+                <a:tc>
+                  <a:txBody>
+                    <a:bodyPr/>
+                    <a:lstStyle/>
+                    <a:p>
+                      <a:r>
+                        <a:rPr lang="sv-SE" sz="1800" dirty="0"/>
+                        <a:t>Details</a:t>
+                      </a:r>
+                    </a:p>
+                  </a:txBody>
+                  <a:tcPr marL="91439" marR="91439" marT="45726" marB="45726"/>
+                </a:tc>
+                <a:extLst>
+                  <a:ext uri="{0D108BD9-81ED-4DB2-BD59-A6C34878D82A}">
+                    <a16:rowId xmlns:a16="http://schemas.microsoft.com/office/drawing/2014/main" val="10000"/>
+                  </a:ext>
+                </a:extLst>
+              </a:tr>
+              <a:tr h="1768057">
+                <a:tc>
+                  <a:txBody>
+                    <a:bodyPr/>
+                    <a:lstStyle/>
+                    <a:p>
+                      <a:pPr marL="0" marR="0" indent="0" algn="l" defTabSz="914400" rtl="0" eaLnBrk="1" fontAlgn="auto" latinLnBrk="0" hangingPunct="1">
+                        <a:lnSpc>
+                          <a:spcPct val="100000"/>
+                        </a:lnSpc>
+                        <a:spcBef>
+                          <a:spcPts val="0"/>
+                        </a:spcBef>
+                        <a:spcAft>
+                          <a:spcPts val="0"/>
+                        </a:spcAft>
+                        <a:buClrTx/>
+                        <a:buSzTx/>
+                        <a:buFontTx/>
+                        <a:buNone/>
+                        <a:tabLst/>
+                        <a:defRPr/>
+                      </a:pPr>
+                      <a:endParaRPr lang="sv-SE" sz="1100" i="1" dirty="0">
+                        <a:effectLst/>
+                      </a:endParaRPr>
+                    </a:p>
+                    <a:p>
+                      <a:pPr marL="0" marR="0" indent="0" algn="l" defTabSz="914400" rtl="0" eaLnBrk="1" fontAlgn="auto" latinLnBrk="0" hangingPunct="1">
+                        <a:lnSpc>
+                          <a:spcPct val="100000"/>
+                        </a:lnSpc>
+                        <a:spcBef>
+                          <a:spcPts val="0"/>
+                        </a:spcBef>
+                        <a:spcAft>
+                          <a:spcPts val="0"/>
+                        </a:spcAft>
+                        <a:buClrTx/>
+                        <a:buSzTx/>
+                        <a:buFontTx/>
+                        <a:buNone/>
+                        <a:tabLst/>
+                        <a:defRPr/>
+                      </a:pPr>
+                      <a:endParaRPr lang="sv-SE" sz="1100" i="1" dirty="0">
+                        <a:effectLst/>
+                      </a:endParaRPr>
+                    </a:p>
+                    <a:p>
+                      <a:r>
+                        <a:rPr lang="en-US" sz="1800" kern="1200" dirty="0">
+                          <a:solidFill>
+                            <a:schemeClr val="dk1"/>
+                          </a:solidFill>
+                          <a:latin typeface="+mn-lt"/>
+                          <a:ea typeface="+mn-ea"/>
+                          <a:cs typeface="+mn-cs"/>
+                        </a:rPr>
+                        <a:t>{</a:t>
+                      </a:r>
+                    </a:p>
+                    <a:p>
+                      <a:r>
+                        <a:rPr lang="en-US" sz="1800" kern="1200" dirty="0">
+                          <a:solidFill>
+                            <a:schemeClr val="dk1"/>
+                          </a:solidFill>
+                          <a:latin typeface="+mn-lt"/>
+                          <a:ea typeface="+mn-ea"/>
+                          <a:cs typeface="+mn-cs"/>
+                        </a:rPr>
+                        <a:t>  "Customer": {</a:t>
+                      </a:r>
+                    </a:p>
+                    <a:p>
+                      <a:r>
+                        <a:rPr lang="en-US" sz="1800" kern="1200" dirty="0">
+                          <a:solidFill>
+                            <a:schemeClr val="dk1"/>
+                          </a:solidFill>
+                          <a:latin typeface="+mn-lt"/>
+                          <a:ea typeface="+mn-ea"/>
+                          <a:cs typeface="+mn-cs"/>
+                        </a:rPr>
+                        <a:t>    "</a:t>
+                      </a:r>
+                      <a:r>
+                        <a:rPr lang="en-US" sz="1800" kern="1200" dirty="0" err="1">
+                          <a:solidFill>
+                            <a:schemeClr val="dk1"/>
+                          </a:solidFill>
+                          <a:latin typeface="+mn-lt"/>
+                          <a:ea typeface="+mn-ea"/>
+                          <a:cs typeface="+mn-cs"/>
+                        </a:rPr>
+                        <a:t>firstName</a:t>
+                      </a:r>
+                      <a:r>
+                        <a:rPr lang="en-US" sz="1800" kern="1200" dirty="0">
+                          <a:solidFill>
+                            <a:schemeClr val="dk1"/>
+                          </a:solidFill>
+                          <a:latin typeface="+mn-lt"/>
+                          <a:ea typeface="+mn-ea"/>
+                          <a:cs typeface="+mn-cs"/>
+                        </a:rPr>
+                        <a:t>": “John",</a:t>
+                      </a:r>
+                    </a:p>
+                    <a:p>
+                      <a:r>
+                        <a:rPr lang="en-US" sz="1800" kern="1200" dirty="0">
+                          <a:solidFill>
+                            <a:schemeClr val="dk1"/>
+                          </a:solidFill>
+                          <a:latin typeface="+mn-lt"/>
+                          <a:ea typeface="+mn-ea"/>
+                          <a:cs typeface="+mn-cs"/>
+                        </a:rPr>
+                        <a:t>    "</a:t>
+                      </a:r>
+                      <a:r>
+                        <a:rPr lang="en-US" sz="1800" kern="1200" dirty="0" err="1">
+                          <a:solidFill>
+                            <a:schemeClr val="dk1"/>
+                          </a:solidFill>
+                          <a:latin typeface="+mn-lt"/>
+                          <a:ea typeface="+mn-ea"/>
+                          <a:cs typeface="+mn-cs"/>
+                        </a:rPr>
+                        <a:t>middleName</a:t>
+                      </a:r>
+                      <a:r>
+                        <a:rPr lang="en-US" sz="1800" kern="1200" dirty="0">
+                          <a:solidFill>
+                            <a:schemeClr val="dk1"/>
+                          </a:solidFill>
+                          <a:latin typeface="+mn-lt"/>
+                          <a:ea typeface="+mn-ea"/>
+                          <a:cs typeface="+mn-cs"/>
+                        </a:rPr>
+                        <a:t>": “Alan",</a:t>
+                      </a:r>
+                    </a:p>
+                    <a:p>
+                      <a:r>
+                        <a:rPr lang="en-US" sz="1800" kern="1200" dirty="0">
+                          <a:solidFill>
+                            <a:schemeClr val="dk1"/>
+                          </a:solidFill>
+                          <a:latin typeface="+mn-lt"/>
+                          <a:ea typeface="+mn-ea"/>
+                          <a:cs typeface="+mn-cs"/>
+                        </a:rPr>
+                        <a:t>    "</a:t>
+                      </a:r>
+                      <a:r>
+                        <a:rPr lang="en-US" sz="1800" kern="1200" dirty="0" err="1">
+                          <a:solidFill>
+                            <a:schemeClr val="dk1"/>
+                          </a:solidFill>
+                          <a:latin typeface="+mn-lt"/>
+                          <a:ea typeface="+mn-ea"/>
+                          <a:cs typeface="+mn-cs"/>
+                        </a:rPr>
+                        <a:t>lastName</a:t>
+                      </a:r>
+                      <a:r>
+                        <a:rPr lang="en-US" sz="1800" kern="1200" dirty="0">
+                          <a:solidFill>
+                            <a:schemeClr val="dk1"/>
+                          </a:solidFill>
+                          <a:latin typeface="+mn-lt"/>
+                          <a:ea typeface="+mn-ea"/>
+                          <a:cs typeface="+mn-cs"/>
+                        </a:rPr>
+                        <a:t>": “Doe",</a:t>
+                      </a:r>
+                    </a:p>
+                    <a:p>
+                      <a:r>
+                        <a:rPr lang="en-US" sz="1800" kern="1200" dirty="0">
+                          <a:solidFill>
+                            <a:schemeClr val="dk1"/>
+                          </a:solidFill>
+                          <a:latin typeface="+mn-lt"/>
+                          <a:ea typeface="+mn-ea"/>
+                          <a:cs typeface="+mn-cs"/>
+                        </a:rPr>
+                        <a:t>    "</a:t>
+                      </a:r>
+                      <a:r>
+                        <a:rPr lang="en-US" sz="1800" kern="1200" dirty="0" err="1">
+                          <a:solidFill>
+                            <a:schemeClr val="dk1"/>
+                          </a:solidFill>
+                          <a:latin typeface="+mn-lt"/>
+                          <a:ea typeface="+mn-ea"/>
+                          <a:cs typeface="+mn-cs"/>
+                        </a:rPr>
+                        <a:t>phoneNumber</a:t>
+                      </a:r>
+                      <a:r>
+                        <a:rPr lang="en-US" sz="1800" kern="1200" dirty="0">
+                          <a:solidFill>
+                            <a:schemeClr val="dk1"/>
+                          </a:solidFill>
+                          <a:latin typeface="+mn-lt"/>
+                          <a:ea typeface="+mn-ea"/>
+                          <a:cs typeface="+mn-cs"/>
+                        </a:rPr>
+                        <a:t>": “555-345-876"</a:t>
+                      </a:r>
+                    </a:p>
+                    <a:p>
+                      <a:r>
+                        <a:rPr lang="en-US" sz="1800" kern="1200" dirty="0">
+                          <a:solidFill>
+                            <a:schemeClr val="dk1"/>
+                          </a:solidFill>
+                          <a:latin typeface="+mn-lt"/>
+                          <a:ea typeface="+mn-ea"/>
+                          <a:cs typeface="+mn-cs"/>
+                        </a:rPr>
+                        <a:t>  }</a:t>
+                      </a:r>
+                    </a:p>
+                    <a:p>
+                      <a:r>
+                        <a:rPr lang="en-US" sz="1800" kern="1200" dirty="0">
+                          <a:solidFill>
+                            <a:schemeClr val="dk1"/>
+                          </a:solidFill>
+                          <a:latin typeface="+mn-lt"/>
+                          <a:ea typeface="+mn-ea"/>
+                          <a:cs typeface="+mn-cs"/>
+                        </a:rPr>
+                        <a:t>}</a:t>
+                      </a:r>
+                      <a:endParaRPr lang="sv-SE" sz="1100" i="1" dirty="0">
+                        <a:effectLst/>
+                      </a:endParaRPr>
+                    </a:p>
+                  </a:txBody>
+                  <a:tcPr marL="91439" marR="91439" marT="45726" marB="45726"/>
+                </a:tc>
+                <a:tc>
+                  <a:txBody>
+                    <a:bodyPr/>
+                    <a:lstStyle/>
+                    <a:p>
+                      <a:pPr marL="285750" indent="-285750">
+                        <a:buFont typeface="Arial" pitchFamily="34" charset="0"/>
+                        <a:buChar char="•"/>
+                      </a:pPr>
+                      <a:r>
+                        <a:rPr lang="en-US" sz="1600" dirty="0"/>
+                        <a:t>JavaScript Object Notation format</a:t>
+                      </a:r>
+                    </a:p>
+                    <a:p>
+                      <a:pPr marL="285750" indent="-285750">
+                        <a:buFont typeface="Arial" pitchFamily="34" charset="0"/>
+                        <a:buChar char="•"/>
+                      </a:pPr>
+                      <a:r>
+                        <a:rPr lang="en-US" sz="1600" dirty="0"/>
+                        <a:t>A “modern” format than XML</a:t>
+                      </a:r>
+                    </a:p>
+                    <a:p>
+                      <a:pPr marL="285750" indent="-285750">
+                        <a:buFont typeface="Arial" pitchFamily="34" charset="0"/>
+                        <a:buChar char="•"/>
+                      </a:pPr>
+                      <a:r>
+                        <a:rPr lang="en-US" sz="1600" dirty="0"/>
+                        <a:t>Considered more compact, more readable and more interoperable than XML</a:t>
+                      </a:r>
+                    </a:p>
+                    <a:p>
+                      <a:pPr marL="285750" indent="-285750">
+                        <a:buFont typeface="Arial" pitchFamily="34" charset="0"/>
+                        <a:buChar char="•"/>
+                      </a:pPr>
+                      <a:endParaRPr lang="en-US" sz="1600" dirty="0"/>
+                    </a:p>
+                    <a:p>
+                      <a:pPr marL="285750" indent="-285750">
+                        <a:buFont typeface="Arial" pitchFamily="34" charset="0"/>
+                        <a:buChar char="•"/>
+                      </a:pPr>
+                      <a:r>
+                        <a:rPr lang="en-US" sz="1600" dirty="0"/>
+                        <a:t>NOTE: There are no “JSON Schemas” in BizTalk.</a:t>
+                      </a:r>
+                    </a:p>
+                    <a:p>
+                      <a:pPr marL="285750" indent="-285750">
+                        <a:buFont typeface="Arial" pitchFamily="34" charset="0"/>
+                        <a:buChar char="•"/>
+                      </a:pPr>
+                      <a:endParaRPr lang="en-US" sz="1600" dirty="0"/>
+                    </a:p>
+                    <a:p>
+                      <a:pPr marL="285750" indent="-285750">
+                        <a:buFont typeface="Arial" pitchFamily="34" charset="0"/>
+                        <a:buChar char="•"/>
+                      </a:pPr>
+                      <a:endParaRPr lang="en-US" sz="1600" dirty="0"/>
+                    </a:p>
+                    <a:p>
+                      <a:endParaRPr lang="sv-SE" sz="1800" dirty="0"/>
+                    </a:p>
+                  </a:txBody>
+                  <a:tcPr marL="91439" marR="91439" marT="45726" marB="45726"/>
+                </a:tc>
+                <a:extLst>
+                  <a:ext uri="{0D108BD9-81ED-4DB2-BD59-A6C34878D82A}">
+                    <a16:rowId xmlns:a16="http://schemas.microsoft.com/office/drawing/2014/main" val="10003"/>
+                  </a:ext>
+                </a:extLst>
+              </a:tr>
+              <a:tr h="1768057">
+                <a:tc>
+                  <a:txBody>
+                    <a:bodyPr/>
+                    <a:lstStyle/>
+                    <a:p>
+                      <a:endParaRPr lang="sv-SE" sz="1100" i="1" dirty="0">
+                        <a:effectLst/>
+                      </a:endParaRPr>
+                    </a:p>
+                    <a:p>
+                      <a:endParaRPr lang="sv-SE" sz="1100" i="1" dirty="0">
+                        <a:effectLst/>
+                      </a:endParaRPr>
+                    </a:p>
+                    <a:p>
+                      <a:r>
+                        <a:rPr lang="sv-SE" sz="1100" i="1" dirty="0">
+                          <a:effectLst/>
+                        </a:rPr>
+                        <a:t>Whatever else interpretable that you can write code to interpret into XML is possible, but no out of the box capabilities exists.</a:t>
+                      </a:r>
+                    </a:p>
+                  </a:txBody>
+                  <a:tcPr marL="91439" marR="91439" marT="45726" marB="45726"/>
+                </a:tc>
+                <a:tc>
+                  <a:txBody>
+                    <a:bodyPr/>
+                    <a:lstStyle/>
+                    <a:p>
+                      <a:pPr marL="285750" indent="-285750">
+                        <a:buFont typeface="Arial" panose="020B0604020202020204" pitchFamily="34" charset="0"/>
+                        <a:buChar char="•"/>
+                      </a:pPr>
+                      <a:r>
+                        <a:rPr lang="sv-SE" sz="1800" dirty="0"/>
+                        <a:t>Binary formats</a:t>
+                      </a:r>
+                    </a:p>
+                    <a:p>
+                      <a:pPr marL="285750" indent="-285750">
+                        <a:buFont typeface="Arial" panose="020B0604020202020204" pitchFamily="34" charset="0"/>
+                        <a:buChar char="•"/>
+                      </a:pPr>
+                      <a:r>
+                        <a:rPr lang="sv-SE" sz="1800" dirty="0"/>
+                        <a:t>Specific application formats</a:t>
+                      </a:r>
+                    </a:p>
+                    <a:p>
+                      <a:pPr marL="285750" indent="-285750">
+                        <a:buFont typeface="Arial" panose="020B0604020202020204" pitchFamily="34" charset="0"/>
+                        <a:buChar char="•"/>
+                      </a:pPr>
+                      <a:endParaRPr lang="sv-SE" sz="1800" dirty="0"/>
+                    </a:p>
+                    <a:p>
+                      <a:pPr marL="285750" indent="-285750">
+                        <a:buFont typeface="Arial" panose="020B0604020202020204" pitchFamily="34" charset="0"/>
+                        <a:buChar char="•"/>
+                      </a:pPr>
+                      <a:r>
+                        <a:rPr lang="sv-SE" sz="1800" dirty="0"/>
+                        <a:t>NOTE: These are most often not handled by ”schemas”, </a:t>
+                      </a:r>
+                      <a:br>
+                        <a:rPr lang="sv-SE" sz="1800" dirty="0"/>
+                      </a:br>
+                      <a:r>
+                        <a:rPr lang="sv-SE" sz="1800" dirty="0"/>
+                        <a:t>but instead handled by ”adapters”. Something we will talk more about later.</a:t>
+                      </a:r>
+                    </a:p>
+                    <a:p>
+                      <a:pPr marL="285750" indent="-285750">
+                        <a:buFont typeface="Arial" panose="020B0604020202020204" pitchFamily="34" charset="0"/>
+                        <a:buChar char="•"/>
+                      </a:pPr>
+                      <a:endParaRPr lang="sv-SE" sz="1800" dirty="0"/>
+                    </a:p>
+                  </a:txBody>
+                  <a:tcPr marL="91439" marR="91439" marT="45726" marB="45726"/>
+                </a:tc>
+                <a:extLst>
+                  <a:ext uri="{0D108BD9-81ED-4DB2-BD59-A6C34878D82A}">
+                    <a16:rowId xmlns:a16="http://schemas.microsoft.com/office/drawing/2014/main" val="2944002245"/>
+                  </a:ext>
+                </a:extLst>
+              </a:tr>
+            </a:tbl>
+          </a:graphicData>
+        </a:graphic>
+      </p:graphicFrame>
+      <p:sp>
+        <p:nvSpPr>
+          <p:cNvPr id="12" name="TextBox 11"/>
+          <p:cNvSpPr txBox="1"/>
+          <p:nvPr/>
+        </p:nvSpPr>
+        <p:spPr>
+          <a:xfrm>
+            <a:off x="309142" y="1772816"/>
+            <a:ext cx="4071937" cy="369332"/>
+          </a:xfrm>
+          <a:prstGeom prst="rect">
+            <a:avLst/>
+          </a:prstGeom>
+          <a:noFill/>
+        </p:spPr>
+        <p:txBody>
+          <a:bodyPr>
+            <a:spAutoFit/>
+          </a:bodyPr>
+          <a:lstStyle/>
+          <a:p>
+            <a:pPr algn="ctr">
+              <a:defRPr/>
+            </a:pPr>
+            <a:r>
+              <a:rPr lang="sv-SE" sz="1800" b="1" dirty="0">
+                <a:effectLst>
+                  <a:outerShdw blurRad="38100" dist="38100" dir="2700000" algn="tl">
+                    <a:srgbClr val="000000">
+                      <a:alpha val="43137"/>
+                    </a:srgbClr>
+                  </a:outerShdw>
+                </a:effectLst>
+              </a:rPr>
+              <a:t>JSON</a:t>
+            </a:r>
+            <a:endParaRPr lang="sv-SE" b="1" dirty="0">
+              <a:effectLst>
+                <a:outerShdw blurRad="38100" dist="38100" dir="2700000" algn="tl">
+                  <a:srgbClr val="000000">
+                    <a:alpha val="43137"/>
+                  </a:srgbClr>
+                </a:outerShdw>
+              </a:effectLst>
+            </a:endParaRPr>
+          </a:p>
+        </p:txBody>
+      </p:sp>
+      <p:sp>
+        <p:nvSpPr>
+          <p:cNvPr id="11" name="TextBox 10">
+            <a:extLst>
+              <a:ext uri="{FF2B5EF4-FFF2-40B4-BE49-F238E27FC236}">
+                <a16:creationId xmlns:a16="http://schemas.microsoft.com/office/drawing/2014/main" id="{F0CC9A03-1F05-4341-B52B-B67881438EC3}"/>
+              </a:ext>
+            </a:extLst>
+          </p:cNvPr>
+          <p:cNvSpPr txBox="1"/>
+          <p:nvPr/>
+        </p:nvSpPr>
+        <p:spPr>
+          <a:xfrm>
+            <a:off x="310594" y="4437112"/>
+            <a:ext cx="4071937" cy="369332"/>
+          </a:xfrm>
+          <a:prstGeom prst="rect">
+            <a:avLst/>
+          </a:prstGeom>
+          <a:noFill/>
+        </p:spPr>
+        <p:txBody>
+          <a:bodyPr>
+            <a:spAutoFit/>
+          </a:bodyPr>
+          <a:lstStyle/>
+          <a:p>
+            <a:pPr algn="ctr">
+              <a:defRPr/>
+            </a:pPr>
+            <a:r>
+              <a:rPr lang="sv-SE" sz="1800" b="1" dirty="0">
+                <a:effectLst>
+                  <a:outerShdw blurRad="38100" dist="38100" dir="2700000" algn="tl">
+                    <a:srgbClr val="000000">
+                      <a:alpha val="43137"/>
+                    </a:srgbClr>
+                  </a:outerShdw>
+                </a:effectLst>
+              </a:rPr>
+              <a:t>Other</a:t>
+            </a:r>
+            <a:endParaRPr lang="sv-SE" b="1" dirty="0">
+              <a:effectLst>
+                <a:outerShdw blurRad="38100" dist="38100" dir="2700000" algn="tl">
+                  <a:srgbClr val="000000">
+                    <a:alpha val="43137"/>
+                  </a:srgbClr>
+                </a:outerShdw>
+              </a:effectLst>
+            </a:endParaRPr>
+          </a:p>
+        </p:txBody>
+      </p:sp>
+    </p:spTree>
+    <p:extLst>
+      <p:ext uri="{BB962C8B-B14F-4D97-AF65-F5344CB8AC3E}">
+        <p14:creationId xmlns:p14="http://schemas.microsoft.com/office/powerpoint/2010/main" val="2963703399"/>
+      </p:ext>
+    </p:extLst>
+  </p:cSld>
+  <p:clrMapOvr>
+    <a:masterClrMapping/>
+  </p:clrMapOvr>
+</p:sld>
+</file>
+
+<file path=ppt/slides/slide11.xml><?xml version="1.0" encoding="utf-8"?>
+<p:sld xmlns:a="http://schemas.openxmlformats.org/drawingml/2006/main" xmlns:r="http://schemas.openxmlformats.org/officeDocument/2006/relationships" xmlns:p="http://schemas.openxmlformats.org/presentationml/2006/main">
+  <p:cSld>
+    <p:spTree>
+      <p:nvGrpSpPr>
+        <p:cNvPr id="1" name=""/>
+        <p:cNvGrpSpPr/>
+        <p:nvPr/>
+      </p:nvGrpSpPr>
+      <p:grpSpPr>
+        <a:xfrm>
+          <a:off x="0" y="0"/>
+          <a:ext cx="0" cy="0"/>
+          <a:chOff x="0" y="0"/>
+          <a:chExt cx="0" cy="0"/>
+        </a:xfrm>
+      </p:grpSpPr>
+      <p:sp>
+        <p:nvSpPr>
           <p:cNvPr id="18434" name="Title 1"/>
           <p:cNvSpPr>
             <a:spLocks noGrp="1"/>
@@ -9690,7 +10342,7 @@
 </p:sld>
 </file>
 
-<file path=ppt/slides/slide11.xml><?xml version="1.0" encoding="utf-8"?>
+<file path=ppt/slides/slide12.xml><?xml version="1.0" encoding="utf-8"?>
 <p:sld xmlns:a="http://schemas.openxmlformats.org/drawingml/2006/main" xmlns:r="http://schemas.openxmlformats.org/officeDocument/2006/relationships" xmlns:p="http://schemas.openxmlformats.org/presentationml/2006/main">
   <p:cSld>
     <p:spTree>
@@ -10219,7 +10871,7 @@
 </p:sld>
 </file>
 
-<file path=ppt/slides/slide12.xml><?xml version="1.0" encoding="utf-8"?>
+<file path=ppt/slides/slide13.xml><?xml version="1.0" encoding="utf-8"?>
 <p:sld xmlns:a="http://schemas.openxmlformats.org/drawingml/2006/main" xmlns:r="http://schemas.openxmlformats.org/officeDocument/2006/relationships" xmlns:p="http://schemas.openxmlformats.org/presentationml/2006/main">
   <p:cSld>
     <p:spTree>
@@ -10436,7 +11088,7 @@
 </p:sld>
 </file>
 
-<file path=ppt/slides/slide13.xml><?xml version="1.0" encoding="utf-8"?>
+<file path=ppt/slides/slide14.xml><?xml version="1.0" encoding="utf-8"?>
 <p:sld xmlns:a="http://schemas.openxmlformats.org/drawingml/2006/main" xmlns:r="http://schemas.openxmlformats.org/officeDocument/2006/relationships" xmlns:p="http://schemas.openxmlformats.org/presentationml/2006/main">
   <p:cSld>
     <p:spTree>
@@ -19674,7 +20326,7 @@
 </p:sld>
 </file>
 
-<file path=ppt/slides/slide14.xml><?xml version="1.0" encoding="utf-8"?>
+<file path=ppt/slides/slide15.xml><?xml version="1.0" encoding="utf-8"?>
 <p:sld xmlns:a="http://schemas.openxmlformats.org/drawingml/2006/main" xmlns:r="http://schemas.openxmlformats.org/officeDocument/2006/relationships" xmlns:p="http://schemas.openxmlformats.org/presentationml/2006/main">
   <p:cSld>
     <p:spTree>
@@ -19819,7 +20471,7 @@
 </p:sld>
 </file>
 
-<file path=ppt/slides/slide15.xml><?xml version="1.0" encoding="utf-8"?>
+<file path=ppt/slides/slide16.xml><?xml version="1.0" encoding="utf-8"?>
 <p:sld xmlns:a="http://schemas.openxmlformats.org/drawingml/2006/main" xmlns:r="http://schemas.openxmlformats.org/officeDocument/2006/relationships" xmlns:p="http://schemas.openxmlformats.org/presentationml/2006/main">
   <p:cSld>
     <p:spTree>
@@ -19948,7 +20600,7 @@
 </p:sld>
 </file>
 
-<file path=ppt/slides/slide16.xml><?xml version="1.0" encoding="utf-8"?>
+<file path=ppt/slides/slide17.xml><?xml version="1.0" encoding="utf-8"?>
 <p:sld xmlns:a="http://schemas.openxmlformats.org/drawingml/2006/main" xmlns:r="http://schemas.openxmlformats.org/officeDocument/2006/relationships" xmlns:p="http://schemas.openxmlformats.org/presentationml/2006/main">
   <p:cSld>
     <p:spTree>
@@ -20093,7 +20745,7 @@
 </p:sld>
 </file>
 
-<file path=ppt/slides/slide17.xml><?xml version="1.0" encoding="utf-8"?>
+<file path=ppt/slides/slide18.xml><?xml version="1.0" encoding="utf-8"?>
 <p:sld xmlns:a="http://schemas.openxmlformats.org/drawingml/2006/main" xmlns:r="http://schemas.openxmlformats.org/officeDocument/2006/relationships" xmlns:p="http://schemas.openxmlformats.org/presentationml/2006/main">
   <p:cSld>
     <p:spTree>
@@ -20349,7 +21001,7 @@
 </p:sld>
 </file>
 
-<file path=ppt/slides/slide18.xml><?xml version="1.0" encoding="utf-8"?>
+<file path=ppt/slides/slide19.xml><?xml version="1.0" encoding="utf-8"?>
 <p:sld xmlns:a="http://schemas.openxmlformats.org/drawingml/2006/main" xmlns:r="http://schemas.openxmlformats.org/officeDocument/2006/relationships" xmlns:p="http://schemas.openxmlformats.org/presentationml/2006/main">
   <p:cSld>
     <p:spTree>
@@ -21068,135 +21720,6 @@
 </p:sld>
 </file>
 
-<file path=ppt/slides/slide19.xml><?xml version="1.0" encoding="utf-8"?>
-<p:sld xmlns:a="http://schemas.openxmlformats.org/drawingml/2006/main" xmlns:r="http://schemas.openxmlformats.org/officeDocument/2006/relationships" xmlns:p="http://schemas.openxmlformats.org/presentationml/2006/main">
-  <p:cSld>
-    <p:spTree>
-      <p:nvGrpSpPr>
-        <p:cNvPr id="1" name=""/>
-        <p:cNvGrpSpPr/>
-        <p:nvPr/>
-      </p:nvGrpSpPr>
-      <p:grpSpPr>
-        <a:xfrm>
-          <a:off x="0" y="0"/>
-          <a:ext cx="0" cy="0"/>
-          <a:chOff x="0" y="0"/>
-          <a:chExt cx="0" cy="0"/>
-        </a:xfrm>
-      </p:grpSpPr>
-      <p:sp>
-        <p:nvSpPr>
-          <p:cNvPr id="26626" name="Title 1"/>
-          <p:cNvSpPr>
-            <a:spLocks noGrp="1"/>
-          </p:cNvSpPr>
-          <p:nvPr>
-            <p:ph type="title"/>
-          </p:nvPr>
-        </p:nvSpPr>
-        <p:spPr/>
-        <p:txBody>
-          <a:bodyPr/>
-          <a:lstStyle/>
-          <a:p>
-            <a:r>
-              <a:rPr lang="sv-SE"/>
-              <a:t>Demo</a:t>
-            </a:r>
-          </a:p>
-        </p:txBody>
-      </p:sp>
-      <p:sp>
-        <p:nvSpPr>
-          <p:cNvPr id="26627" name="Content Placeholder 2"/>
-          <p:cNvSpPr>
-            <a:spLocks noGrp="1"/>
-          </p:cNvSpPr>
-          <p:nvPr>
-            <p:ph idx="1"/>
-          </p:nvPr>
-        </p:nvSpPr>
-        <p:spPr/>
-        <p:txBody>
-          <a:bodyPr/>
-          <a:lstStyle/>
-          <a:p>
-            <a:r>
-              <a:rPr lang="sv-SE" sz="2400" b="1"/>
-              <a:t>Create a Schema using the BizTalk Schema Editor in Visual Studio</a:t>
-            </a:r>
-          </a:p>
-          <a:p>
-            <a:r>
-              <a:rPr lang="sv-SE" sz="2400" b="1"/>
-              <a:t>Validate and test schema</a:t>
-            </a:r>
-          </a:p>
-        </p:txBody>
-      </p:sp>
-      <p:pic>
-        <p:nvPicPr>
-          <p:cNvPr id="26630" name="Picture 2" descr="http://icons.iconarchive.com/icons/artua/mac/Play-512x512.png"/>
-          <p:cNvPicPr>
-            <a:picLocks noChangeAspect="1" noChangeArrowheads="1"/>
-          </p:cNvPicPr>
-          <p:nvPr/>
-        </p:nvPicPr>
-        <p:blipFill>
-          <a:blip r:embed="rId3">
-            <a:extLst>
-              <a:ext uri="{28A0092B-C50C-407E-A947-70E740481C1C}">
-                <a14:useLocalDpi xmlns:a14="http://schemas.microsoft.com/office/drawing/2010/main" val="0"/>
-              </a:ext>
-            </a:extLst>
-          </a:blip>
-          <a:srcRect/>
-          <a:stretch>
-            <a:fillRect/>
-          </a:stretch>
-        </p:blipFill>
-        <p:spPr bwMode="auto">
-          <a:xfrm>
-            <a:off x="5357813" y="2786063"/>
-            <a:ext cx="3786187" cy="3786187"/>
-          </a:xfrm>
-          <a:prstGeom prst="rect">
-            <a:avLst/>
-          </a:prstGeom>
-          <a:noFill/>
-          <a:ln>
-            <a:noFill/>
-          </a:ln>
-          <a:extLst>
-            <a:ext uri="{909E8E84-426E-40DD-AFC4-6F175D3DCCD1}">
-              <a14:hiddenFill xmlns:a14="http://schemas.microsoft.com/office/drawing/2010/main">
-                <a:solidFill>
-                  <a:srgbClr val="FFFFFF"/>
-                </a:solidFill>
-              </a14:hiddenFill>
-            </a:ext>
-            <a:ext uri="{91240B29-F687-4F45-9708-019B960494DF}">
-              <a14:hiddenLine xmlns:a14="http://schemas.microsoft.com/office/drawing/2010/main" w="9525">
-                <a:solidFill>
-                  <a:srgbClr val="000000"/>
-                </a:solidFill>
-                <a:miter lim="800000"/>
-                <a:headEnd/>
-                <a:tailEnd/>
-              </a14:hiddenLine>
-            </a:ext>
-          </a:extLst>
-        </p:spPr>
-      </p:pic>
-    </p:spTree>
-  </p:cSld>
-  <p:clrMapOvr>
-    <a:masterClrMapping/>
-  </p:clrMapOvr>
-</p:sld>
-</file>
-
 <file path=ppt/slides/slide2.xml><?xml version="1.0" encoding="utf-8"?>
 <p:sld xmlns:a="http://schemas.openxmlformats.org/drawingml/2006/main" xmlns:r="http://schemas.openxmlformats.org/officeDocument/2006/relationships" xmlns:p="http://schemas.openxmlformats.org/presentationml/2006/main">
   <p:cSld>
@@ -21637,6 +22160,135 @@
       </p:grpSpPr>
       <p:sp>
         <p:nvSpPr>
+          <p:cNvPr id="26626" name="Title 1"/>
+          <p:cNvSpPr>
+            <a:spLocks noGrp="1"/>
+          </p:cNvSpPr>
+          <p:nvPr>
+            <p:ph type="title"/>
+          </p:nvPr>
+        </p:nvSpPr>
+        <p:spPr/>
+        <p:txBody>
+          <a:bodyPr/>
+          <a:lstStyle/>
+          <a:p>
+            <a:r>
+              <a:rPr lang="sv-SE"/>
+              <a:t>Demo</a:t>
+            </a:r>
+          </a:p>
+        </p:txBody>
+      </p:sp>
+      <p:sp>
+        <p:nvSpPr>
+          <p:cNvPr id="26627" name="Content Placeholder 2"/>
+          <p:cNvSpPr>
+            <a:spLocks noGrp="1"/>
+          </p:cNvSpPr>
+          <p:nvPr>
+            <p:ph idx="1"/>
+          </p:nvPr>
+        </p:nvSpPr>
+        <p:spPr/>
+        <p:txBody>
+          <a:bodyPr/>
+          <a:lstStyle/>
+          <a:p>
+            <a:r>
+              <a:rPr lang="sv-SE" sz="2400" b="1"/>
+              <a:t>Create a Schema using the BizTalk Schema Editor in Visual Studio</a:t>
+            </a:r>
+          </a:p>
+          <a:p>
+            <a:r>
+              <a:rPr lang="sv-SE" sz="2400" b="1"/>
+              <a:t>Validate and test schema</a:t>
+            </a:r>
+          </a:p>
+        </p:txBody>
+      </p:sp>
+      <p:pic>
+        <p:nvPicPr>
+          <p:cNvPr id="26630" name="Picture 2" descr="http://icons.iconarchive.com/icons/artua/mac/Play-512x512.png"/>
+          <p:cNvPicPr>
+            <a:picLocks noChangeAspect="1" noChangeArrowheads="1"/>
+          </p:cNvPicPr>
+          <p:nvPr/>
+        </p:nvPicPr>
+        <p:blipFill>
+          <a:blip r:embed="rId3">
+            <a:extLst>
+              <a:ext uri="{28A0092B-C50C-407E-A947-70E740481C1C}">
+                <a14:useLocalDpi xmlns:a14="http://schemas.microsoft.com/office/drawing/2010/main" val="0"/>
+              </a:ext>
+            </a:extLst>
+          </a:blip>
+          <a:srcRect/>
+          <a:stretch>
+            <a:fillRect/>
+          </a:stretch>
+        </p:blipFill>
+        <p:spPr bwMode="auto">
+          <a:xfrm>
+            <a:off x="5357813" y="2786063"/>
+            <a:ext cx="3786187" cy="3786187"/>
+          </a:xfrm>
+          <a:prstGeom prst="rect">
+            <a:avLst/>
+          </a:prstGeom>
+          <a:noFill/>
+          <a:ln>
+            <a:noFill/>
+          </a:ln>
+          <a:extLst>
+            <a:ext uri="{909E8E84-426E-40DD-AFC4-6F175D3DCCD1}">
+              <a14:hiddenFill xmlns:a14="http://schemas.microsoft.com/office/drawing/2010/main">
+                <a:solidFill>
+                  <a:srgbClr val="FFFFFF"/>
+                </a:solidFill>
+              </a14:hiddenFill>
+            </a:ext>
+            <a:ext uri="{91240B29-F687-4F45-9708-019B960494DF}">
+              <a14:hiddenLine xmlns:a14="http://schemas.microsoft.com/office/drawing/2010/main" w="9525">
+                <a:solidFill>
+                  <a:srgbClr val="000000"/>
+                </a:solidFill>
+                <a:miter lim="800000"/>
+                <a:headEnd/>
+                <a:tailEnd/>
+              </a14:hiddenLine>
+            </a:ext>
+          </a:extLst>
+        </p:spPr>
+      </p:pic>
+    </p:spTree>
+  </p:cSld>
+  <p:clrMapOvr>
+    <a:masterClrMapping/>
+  </p:clrMapOvr>
+</p:sld>
+</file>
+
+<file path=ppt/slides/slide21.xml><?xml version="1.0" encoding="utf-8"?>
+<p:sld xmlns:a="http://schemas.openxmlformats.org/drawingml/2006/main" xmlns:r="http://schemas.openxmlformats.org/officeDocument/2006/relationships" xmlns:p="http://schemas.openxmlformats.org/presentationml/2006/main">
+  <p:cSld>
+    <p:spTree>
+      <p:nvGrpSpPr>
+        <p:cNvPr id="1" name=""/>
+        <p:cNvGrpSpPr/>
+        <p:nvPr/>
+      </p:nvGrpSpPr>
+      <p:grpSpPr>
+        <a:xfrm>
+          <a:off x="0" y="0"/>
+          <a:ext cx="0" cy="0"/>
+          <a:chOff x="0" y="0"/>
+          <a:chExt cx="0" cy="0"/>
+        </a:xfrm>
+      </p:grpSpPr>
+      <p:sp>
+        <p:nvSpPr>
           <p:cNvPr id="27650" name="Title 1"/>
           <p:cNvSpPr>
             <a:spLocks noGrp="1"/>
@@ -21940,7 +22592,7 @@
 </p:sld>
 </file>
 
-<file path=ppt/slides/slide21.xml><?xml version="1.0" encoding="utf-8"?>
+<file path=ppt/slides/slide22.xml><?xml version="1.0" encoding="utf-8"?>
 <p:sld xmlns:a="http://schemas.openxmlformats.org/drawingml/2006/main" xmlns:r="http://schemas.openxmlformats.org/officeDocument/2006/relationships" xmlns:p="http://schemas.openxmlformats.org/presentationml/2006/main">
   <p:cSld>
     <p:spTree>
@@ -22069,7 +22721,7 @@
 </p:sld>
 </file>
 
-<file path=ppt/slides/slide22.xml><?xml version="1.0" encoding="utf-8"?>
+<file path=ppt/slides/slide23.xml><?xml version="1.0" encoding="utf-8"?>
 <p:sld xmlns:a="http://schemas.openxmlformats.org/drawingml/2006/main" xmlns:r="http://schemas.openxmlformats.org/officeDocument/2006/relationships" xmlns:p="http://schemas.openxmlformats.org/presentationml/2006/main">
   <p:cSld>
     <p:spTree>
@@ -22170,7 +22822,7 @@
 </p:sld>
 </file>
 
-<file path=ppt/slides/slide23.xml><?xml version="1.0" encoding="utf-8"?>
+<file path=ppt/slides/slide24.xml><?xml version="1.0" encoding="utf-8"?>
 <p:sld xmlns:a="http://schemas.openxmlformats.org/drawingml/2006/main" xmlns:r="http://schemas.openxmlformats.org/officeDocument/2006/relationships" xmlns:p="http://schemas.openxmlformats.org/presentationml/2006/main">
   <p:cSld>
     <p:spTree>
@@ -22253,7 +22905,7 @@
 </p:sld>
 </file>
 
-<file path=ppt/slides/slide24.xml><?xml version="1.0" encoding="utf-8"?>
+<file path=ppt/slides/slide25.xml><?xml version="1.0" encoding="utf-8"?>
 <p:sld xmlns:a="http://schemas.openxmlformats.org/drawingml/2006/main" xmlns:r="http://schemas.openxmlformats.org/officeDocument/2006/relationships" xmlns:p="http://schemas.openxmlformats.org/presentationml/2006/main">
   <p:cSld>
     <p:spTree>
@@ -22489,7 +23141,7 @@
 </p:sld>
 </file>
 
-<file path=ppt/slides/slide25.xml><?xml version="1.0" encoding="utf-8"?>
+<file path=ppt/slides/slide26.xml><?xml version="1.0" encoding="utf-8"?>
 <p:sld xmlns:a="http://schemas.openxmlformats.org/drawingml/2006/main" xmlns:r="http://schemas.openxmlformats.org/officeDocument/2006/relationships" xmlns:p="http://schemas.openxmlformats.org/presentationml/2006/main">
   <p:cSld>
     <p:spTree>
@@ -31450,7 +32102,13 @@
           <p:cNvGraphicFramePr>
             <a:graphicFrameLocks noGrp="1"/>
           </p:cNvGraphicFramePr>
-          <p:nvPr/>
+          <p:nvPr>
+            <p:extLst>
+              <p:ext uri="{D42A27DB-BD31-4B8C-83A1-F6EECF244321}">
+                <p14:modId xmlns:p14="http://schemas.microsoft.com/office/powerpoint/2010/main" val="1018739180"/>
+              </p:ext>
+            </p:extLst>
+          </p:nvPr>
         </p:nvGraphicFramePr>
         <p:xfrm>
           <a:off x="285750" y="1285875"/>
@@ -32673,55 +33331,6 @@
           </a:p>
         </p:txBody>
       </p:sp>
-      <p:pic>
-        <p:nvPicPr>
-          <p:cNvPr id="10" name="Picture 5" descr="C:\Users\hedbergjh\Pictures\Microsoft Clip Organizer\00432684.png"/>
-          <p:cNvPicPr>
-            <a:picLocks noChangeAspect="1" noChangeArrowheads="1"/>
-          </p:cNvPicPr>
-          <p:nvPr/>
-        </p:nvPicPr>
-        <p:blipFill>
-          <a:blip r:embed="rId2" cstate="print">
-            <a:duotone>
-              <a:prstClr val="black"/>
-              <a:schemeClr val="accent5">
-                <a:lumMod val="75000"/>
-                <a:tint val="45000"/>
-                <a:satMod val="400000"/>
-              </a:schemeClr>
-            </a:duotone>
-            <a:extLst>
-              <a:ext uri="{28A0092B-C50C-407E-A947-70E740481C1C}">
-                <a14:useLocalDpi xmlns:a14="http://schemas.microsoft.com/office/drawing/2010/main" val="0"/>
-              </a:ext>
-            </a:extLst>
-          </a:blip>
-          <a:srcRect/>
-          <a:stretch>
-            <a:fillRect/>
-          </a:stretch>
-        </p:blipFill>
-        <p:spPr bwMode="auto">
-          <a:xfrm>
-            <a:off x="-15874" y="6525344"/>
-            <a:ext cx="360040" cy="360040"/>
-          </a:xfrm>
-          <a:prstGeom prst="rect">
-            <a:avLst/>
-          </a:prstGeom>
-          <a:noFill/>
-          <a:extLst>
-            <a:ext uri="{909E8E84-426E-40DD-AFC4-6F175D3DCCD1}">
-              <a14:hiddenFill xmlns:a14="http://schemas.microsoft.com/office/drawing/2010/main">
-                <a:solidFill>
-                  <a:srgbClr val="FFFFFF"/>
-                </a:solidFill>
-              </a14:hiddenFill>
-            </a:ext>
-          </a:extLst>
-        </p:spPr>
-      </p:pic>
     </p:spTree>
   </p:cSld>
   <p:clrMapOvr>

</xml_diff>